<commit_message>
small changes and fixes
</commit_message>
<xml_diff>
--- a/presentation/Presentation.pptx
+++ b/presentation/Presentation.pptx
@@ -1789,7 +1789,11 @@
         <a:lstStyle/>
         <a:p>
           <a:r>
-            <a:rPr lang="de-DE" sz="1600" dirty="0"/>
+            <a:rPr lang="de-DE" sz="1600" dirty="0">
+              <a:solidFill>
+                <a:srgbClr val="232F3E"/>
+              </a:solidFill>
+            </a:rPr>
             <a:t>Semantische Repräsentation</a:t>
           </a:r>
         </a:p>
@@ -1883,7 +1887,11 @@
         <a:lstStyle/>
         <a:p>
           <a:r>
-            <a:rPr lang="de-DE" sz="1600" dirty="0"/>
+            <a:rPr lang="de-DE" sz="1600" dirty="0">
+              <a:solidFill>
+                <a:srgbClr val="232F3E"/>
+              </a:solidFill>
+            </a:rPr>
             <a:t>Übersetzung</a:t>
           </a:r>
         </a:p>
@@ -2012,20 +2020,38 @@
     </dgm:pt>
     <dgm:pt modelId="{D5CFB957-4D15-4BA1-A459-D9B67A155332}">
       <dgm:prSet/>
-      <dgm:spPr/>
+      <dgm:spPr>
+        <a:ln>
+          <a:solidFill>
+            <a:srgbClr val="3A4351"/>
+          </a:solidFill>
+        </a:ln>
+      </dgm:spPr>
       <dgm:t>
         <a:bodyPr/>
         <a:lstStyle/>
         <a:p>
           <a:r>
-            <a:rPr lang="de-DE" dirty="0"/>
+            <a:rPr lang="de-DE" dirty="0">
+              <a:solidFill>
+                <a:srgbClr val="3A4351"/>
+              </a:solidFill>
+            </a:rPr>
             <a:t>Hello +</a:t>
           </a:r>
           <a:br>
-            <a:rPr lang="de-DE" dirty="0"/>
+            <a:rPr lang="de-DE" dirty="0">
+              <a:solidFill>
+                <a:srgbClr val="3A4351"/>
+              </a:solidFill>
+            </a:rPr>
           </a:br>
           <a:r>
-            <a:rPr lang="de-DE" dirty="0"/>
+            <a:rPr lang="de-DE" dirty="0">
+              <a:solidFill>
+                <a:srgbClr val="3A4351"/>
+              </a:solidFill>
+            </a:rPr>
             <a:t>World</a:t>
           </a:r>
         </a:p>
@@ -2044,53 +2070,105 @@
     </dgm:pt>
     <dgm:pt modelId="{7F55EF3F-3215-467A-A7B0-657441755E3F}" type="sibTrans" cxnId="{8C436179-3D2D-40D4-A4D8-35F443155456}">
       <dgm:prSet/>
-      <dgm:spPr/>
+      <dgm:spPr>
+        <a:solidFill>
+          <a:schemeClr val="tx2">
+            <a:lumMod val="20000"/>
+            <a:lumOff val="80000"/>
+          </a:schemeClr>
+        </a:solidFill>
+      </dgm:spPr>
       <dgm:t>
         <a:bodyPr/>
         <a:lstStyle/>
         <a:p>
-          <a:endParaRPr lang="de-DE"/>
+          <a:endParaRPr lang="de-DE">
+            <a:solidFill>
+              <a:srgbClr val="252F3E"/>
+            </a:solidFill>
+          </a:endParaRPr>
         </a:p>
       </dgm:t>
     </dgm:pt>
     <dgm:pt modelId="{4A83DE0C-AC5A-4992-894D-0D7C204C7DA4}">
       <dgm:prSet/>
-      <dgm:spPr/>
+      <dgm:spPr>
+        <a:ln>
+          <a:solidFill>
+            <a:srgbClr val="3A4351"/>
+          </a:solidFill>
+        </a:ln>
+      </dgm:spPr>
       <dgm:t>
         <a:bodyPr/>
         <a:lstStyle/>
         <a:p>
           <a:r>
-            <a:rPr lang="de-DE" dirty="0" err="1"/>
+            <a:rPr lang="de-DE" dirty="0" err="1">
+              <a:solidFill>
+                <a:srgbClr val="3A4351"/>
+              </a:solidFill>
+            </a:rPr>
             <a:t>hə‘ləʊ</a:t>
           </a:r>
           <a:r>
-            <a:rPr lang="de-DE" dirty="0"/>
+            <a:rPr lang="de-DE" dirty="0">
+              <a:solidFill>
+                <a:srgbClr val="3A4351"/>
+              </a:solidFill>
+            </a:rPr>
             <a:t> +</a:t>
           </a:r>
           <a:br>
-            <a:rPr lang="de-DE" dirty="0"/>
+            <a:rPr lang="de-DE" dirty="0">
+              <a:solidFill>
+                <a:srgbClr val="3A4351"/>
+              </a:solidFill>
+            </a:rPr>
           </a:br>
           <a:r>
-            <a:rPr lang="de-DE" dirty="0"/>
+            <a:rPr lang="de-DE" dirty="0">
+              <a:solidFill>
+                <a:srgbClr val="3A4351"/>
+              </a:solidFill>
+            </a:rPr>
             <a:t>‚</a:t>
           </a:r>
           <a:r>
-            <a:rPr lang="de-DE" dirty="0" err="1"/>
+            <a:rPr lang="de-DE" dirty="0" err="1">
+              <a:solidFill>
+                <a:srgbClr val="3A4351"/>
+              </a:solidFill>
+            </a:rPr>
             <a:t>wAɜ:ld</a:t>
           </a:r>
-          <a:endParaRPr lang="de-DE" dirty="0"/>
+          <a:endParaRPr lang="de-DE" dirty="0">
+            <a:solidFill>
+              <a:srgbClr val="3A4351"/>
+            </a:solidFill>
+          </a:endParaRPr>
         </a:p>
       </dgm:t>
     </dgm:pt>
     <dgm:pt modelId="{FDB01653-F460-4474-8206-1F602D89CEB7}" type="sibTrans" cxnId="{AEFA7C7B-7C5E-4A5B-8109-C6A04B6DF45B}">
       <dgm:prSet/>
-      <dgm:spPr/>
+      <dgm:spPr>
+        <a:solidFill>
+          <a:schemeClr val="tx2">
+            <a:lumMod val="20000"/>
+            <a:lumOff val="80000"/>
+          </a:schemeClr>
+        </a:solidFill>
+      </dgm:spPr>
       <dgm:t>
         <a:bodyPr/>
         <a:lstStyle/>
         <a:p>
-          <a:endParaRPr lang="de-DE"/>
+          <a:endParaRPr lang="de-DE">
+            <a:solidFill>
+              <a:srgbClr val="FF9900"/>
+            </a:solidFill>
+          </a:endParaRPr>
         </a:p>
       </dgm:t>
     </dgm:pt>
@@ -2123,7 +2201,7 @@
       <dgm:spPr/>
     </dgm:pt>
     <dgm:pt modelId="{8C88AAFD-2E86-4A92-9FD9-13EC394C7DBD}" type="pres">
-      <dgm:prSet presAssocID="{FDB01653-F460-4474-8206-1F602D89CEB7}" presName="sibTrans" presStyleLbl="sibTrans2D1" presStyleIdx="0" presStyleCnt="2"/>
+      <dgm:prSet presAssocID="{FDB01653-F460-4474-8206-1F602D89CEB7}" presName="sibTrans" presStyleLbl="sibTrans2D1" presStyleIdx="0" presStyleCnt="2" custLinFactNeighborX="5404" custLinFactNeighborY="50202"/>
       <dgm:spPr/>
     </dgm:pt>
     <dgm:pt modelId="{594D6DE5-B481-40D8-9DCF-994BCF83CE3C}" type="pres">
@@ -2139,7 +2217,7 @@
       <dgm:spPr/>
     </dgm:pt>
     <dgm:pt modelId="{DF96941C-6F82-4AD6-A9D8-2629D7CECFB3}" type="pres">
-      <dgm:prSet presAssocID="{7F55EF3F-3215-467A-A7B0-657441755E3F}" presName="sibTrans" presStyleLbl="sibTrans2D1" presStyleIdx="1" presStyleCnt="2"/>
+      <dgm:prSet presAssocID="{7F55EF3F-3215-467A-A7B0-657441755E3F}" presName="sibTrans" presStyleLbl="sibTrans2D1" presStyleIdx="1" presStyleCnt="2" custLinFactNeighborX="-4474" custLinFactNeighborY="-46097"/>
       <dgm:spPr/>
     </dgm:pt>
     <dgm:pt modelId="{F66F188F-C6BE-4DC9-8266-6EC34D9807C7}" type="pres">
@@ -2312,7 +2390,11 @@
             <a:buNone/>
           </a:pPr>
           <a:r>
-            <a:rPr lang="de-DE" sz="1600" kern="1200" dirty="0"/>
+            <a:rPr lang="de-DE" sz="1600" kern="1200" dirty="0">
+              <a:solidFill>
+                <a:srgbClr val="232F3E"/>
+              </a:solidFill>
+            </a:rPr>
             <a:t>Semantische Repräsentation</a:t>
           </a:r>
         </a:p>
@@ -2448,7 +2530,11 @@
             <a:buNone/>
           </a:pPr>
           <a:r>
-            <a:rPr lang="de-DE" sz="1600" kern="1200" dirty="0"/>
+            <a:rPr lang="de-DE" sz="1600" kern="1200" dirty="0">
+              <a:solidFill>
+                <a:srgbClr val="232F3E"/>
+              </a:solidFill>
+            </a:rPr>
             <a:t>Übersetzung</a:t>
           </a:r>
         </a:p>
@@ -2493,13 +2579,7 @@
         </a:solidFill>
         <a:ln w="12700" cap="flat" cmpd="sng" algn="ctr">
           <a:solidFill>
-            <a:schemeClr val="dk2">
-              <a:shade val="80000"/>
-              <a:hueOff val="0"/>
-              <a:satOff val="0"/>
-              <a:lumOff val="0"/>
-              <a:alphaOff val="0"/>
-            </a:schemeClr>
+            <a:srgbClr val="3A4351"/>
           </a:solidFill>
           <a:prstDash val="solid"/>
           <a:miter lim="800000"/>
@@ -2539,25 +2619,49 @@
             <a:buNone/>
           </a:pPr>
           <a:r>
-            <a:rPr lang="de-DE" sz="2300" kern="1200" dirty="0" err="1"/>
+            <a:rPr lang="de-DE" sz="2300" kern="1200" dirty="0" err="1">
+              <a:solidFill>
+                <a:srgbClr val="3A4351"/>
+              </a:solidFill>
+            </a:rPr>
             <a:t>hə‘ləʊ</a:t>
           </a:r>
           <a:r>
-            <a:rPr lang="de-DE" sz="2300" kern="1200" dirty="0"/>
+            <a:rPr lang="de-DE" sz="2300" kern="1200" dirty="0">
+              <a:solidFill>
+                <a:srgbClr val="3A4351"/>
+              </a:solidFill>
+            </a:rPr>
             <a:t> +</a:t>
           </a:r>
           <a:br>
-            <a:rPr lang="de-DE" sz="2300" kern="1200" dirty="0"/>
+            <a:rPr lang="de-DE" sz="2300" kern="1200" dirty="0">
+              <a:solidFill>
+                <a:srgbClr val="3A4351"/>
+              </a:solidFill>
+            </a:rPr>
           </a:br>
           <a:r>
-            <a:rPr lang="de-DE" sz="2300" kern="1200" dirty="0"/>
+            <a:rPr lang="de-DE" sz="2300" kern="1200" dirty="0">
+              <a:solidFill>
+                <a:srgbClr val="3A4351"/>
+              </a:solidFill>
+            </a:rPr>
             <a:t>‚</a:t>
           </a:r>
           <a:r>
-            <a:rPr lang="de-DE" sz="2300" kern="1200" dirty="0" err="1"/>
+            <a:rPr lang="de-DE" sz="2300" kern="1200" dirty="0" err="1">
+              <a:solidFill>
+                <a:srgbClr val="3A4351"/>
+              </a:solidFill>
+            </a:rPr>
             <a:t>wAɜ:ld</a:t>
           </a:r>
-          <a:endParaRPr lang="de-DE" sz="2300" kern="1200" dirty="0"/>
+          <a:endParaRPr lang="de-DE" sz="2300" kern="1200" dirty="0">
+            <a:solidFill>
+              <a:srgbClr val="3A4351"/>
+            </a:solidFill>
+          </a:endParaRPr>
         </a:p>
       </dsp:txBody>
       <dsp:txXfrm>
@@ -2572,7 +2676,7 @@
       </dsp:nvSpPr>
       <dsp:spPr>
         <a:xfrm rot="21599702">
-          <a:off x="1403057" y="-215738"/>
+          <a:off x="1464637" y="30461"/>
           <a:ext cx="1139534" cy="490418"/>
         </a:xfrm>
         <a:prstGeom prst="rightArrow">
@@ -2582,12 +2686,9 @@
           </a:avLst>
         </a:prstGeom>
         <a:solidFill>
-          <a:schemeClr val="dk2">
-            <a:tint val="60000"/>
-            <a:hueOff val="0"/>
-            <a:satOff val="0"/>
-            <a:lumOff val="0"/>
-            <a:alphaOff val="0"/>
+          <a:schemeClr val="tx2">
+            <a:lumMod val="20000"/>
+            <a:lumOff val="80000"/>
           </a:schemeClr>
         </a:solidFill>
         <a:ln>
@@ -2627,11 +2728,15 @@
             </a:spcAft>
             <a:buNone/>
           </a:pPr>
-          <a:endParaRPr lang="de-DE" sz="1900" kern="1200"/>
+          <a:endParaRPr lang="de-DE" sz="1900" kern="1200">
+            <a:solidFill>
+              <a:srgbClr val="FF9900"/>
+            </a:solidFill>
+          </a:endParaRPr>
         </a:p>
       </dsp:txBody>
       <dsp:txXfrm>
-        <a:off x="1403057" y="-117648"/>
+        <a:off x="1464637" y="128551"/>
         <a:ext cx="992409" cy="294250"/>
       </dsp:txXfrm>
     </dsp:sp>
@@ -2658,13 +2763,7 @@
         </a:solidFill>
         <a:ln w="12700" cap="flat" cmpd="sng" algn="ctr">
           <a:solidFill>
-            <a:schemeClr val="dk2">
-              <a:shade val="80000"/>
-              <a:hueOff val="0"/>
-              <a:satOff val="0"/>
-              <a:lumOff val="0"/>
-              <a:alphaOff val="0"/>
-            </a:schemeClr>
+            <a:srgbClr val="3A4351"/>
           </a:solidFill>
           <a:prstDash val="solid"/>
           <a:miter lim="800000"/>
@@ -2704,14 +2803,26 @@
             <a:buNone/>
           </a:pPr>
           <a:r>
-            <a:rPr lang="de-DE" sz="2300" kern="1200" dirty="0"/>
+            <a:rPr lang="de-DE" sz="2300" kern="1200" dirty="0">
+              <a:solidFill>
+                <a:srgbClr val="3A4351"/>
+              </a:solidFill>
+            </a:rPr>
             <a:t>Hello +</a:t>
           </a:r>
           <a:br>
-            <a:rPr lang="de-DE" sz="2300" kern="1200" dirty="0"/>
+            <a:rPr lang="de-DE" sz="2300" kern="1200" dirty="0">
+              <a:solidFill>
+                <a:srgbClr val="3A4351"/>
+              </a:solidFill>
+            </a:rPr>
           </a:br>
           <a:r>
-            <a:rPr lang="de-DE" sz="2300" kern="1200" dirty="0"/>
+            <a:rPr lang="de-DE" sz="2300" kern="1200" dirty="0">
+              <a:solidFill>
+                <a:srgbClr val="3A4351"/>
+              </a:solidFill>
+            </a:rPr>
             <a:t>World</a:t>
           </a:r>
         </a:p>
@@ -2728,7 +2839,7 @@
       </dsp:nvSpPr>
       <dsp:spPr>
         <a:xfrm rot="10799651">
-          <a:off x="1467756" y="1179095"/>
+          <a:off x="1416779" y="953026"/>
           <a:ext cx="1139395" cy="490418"/>
         </a:xfrm>
         <a:prstGeom prst="rightArrow">
@@ -2738,12 +2849,9 @@
           </a:avLst>
         </a:prstGeom>
         <a:solidFill>
-          <a:schemeClr val="dk2">
-            <a:tint val="60000"/>
-            <a:hueOff val="0"/>
-            <a:satOff val="0"/>
-            <a:lumOff val="0"/>
-            <a:alphaOff val="0"/>
+          <a:schemeClr val="tx2">
+            <a:lumMod val="20000"/>
+            <a:lumOff val="80000"/>
           </a:schemeClr>
         </a:solidFill>
         <a:ln>
@@ -2783,11 +2891,15 @@
             </a:spcAft>
             <a:buNone/>
           </a:pPr>
-          <a:endParaRPr lang="de-DE" sz="1900" kern="1200"/>
+          <a:endParaRPr lang="de-DE" sz="1900" kern="1200">
+            <a:solidFill>
+              <a:srgbClr val="252F3E"/>
+            </a:solidFill>
+          </a:endParaRPr>
         </a:p>
       </dsp:txBody>
       <dsp:txXfrm rot="10800000">
-        <a:off x="1614881" y="1277172"/>
+        <a:off x="1563904" y="1051103"/>
         <a:ext cx="992270" cy="294250"/>
       </dsp:txXfrm>
     </dsp:sp>
@@ -5437,7 +5549,7 @@
           <a:p>
             <a:fld id="{ED0A1DBB-797E-4506-A4A1-6C28A1F53B5C}" type="datetimeFigureOut">
               <a:rPr lang="de-DE" smtClean="0"/>
-              <a:t>10.11.2020</a:t>
+              <a:t>11.11.2020</a:t>
             </a:fld>
             <a:endParaRPr lang="de-DE"/>
           </a:p>
@@ -5595,7 +5707,7 @@
           <a:p>
             <a:fld id="{3550EC8D-4459-4C5E-9CE4-2601D044F803}" type="slidenum">
               <a:rPr lang="de-DE" smtClean="0"/>
-              <a:t>‹Nr.›</a:t>
+              <a:t>‹#›</a:t>
             </a:fld>
             <a:endParaRPr lang="de-DE"/>
           </a:p>
@@ -6209,7 +6321,7 @@
                 <a:tabLst/>
                 <a:defRPr/>
               </a:pPr>
-              <a:t>‹Nr.›</a:t>
+              <a:t>‹#›</a:t>
             </a:fld>
             <a:endParaRPr lang="de-DE" sz="1200" dirty="0">
               <a:solidFill>
@@ -6731,7 +6843,7 @@
                 <a:tabLst/>
                 <a:defRPr/>
               </a:pPr>
-              <a:t>‹Nr.›</a:t>
+              <a:t>‹#›</a:t>
             </a:fld>
             <a:endParaRPr lang="de-DE" sz="1200" dirty="0">
               <a:solidFill>
@@ -7154,7 +7266,7 @@
                 <a:tabLst/>
                 <a:defRPr/>
               </a:pPr>
-              <a:t>‹Nr.›</a:t>
+              <a:t>‹#›</a:t>
             </a:fld>
             <a:endParaRPr lang="de-DE" sz="1200" dirty="0">
               <a:solidFill>
@@ -7593,7 +7705,7 @@
                 <a:tabLst/>
                 <a:defRPr/>
               </a:pPr>
-              <a:t>‹Nr.›</a:t>
+              <a:t>‹#›</a:t>
             </a:fld>
             <a:endParaRPr lang="de-DE" sz="1200" dirty="0">
               <a:solidFill>
@@ -8078,7 +8190,7 @@
                 <a:tabLst/>
                 <a:defRPr/>
               </a:pPr>
-              <a:t>‹Nr.›</a:t>
+              <a:t>‹#›</a:t>
             </a:fld>
             <a:endParaRPr lang="de-DE" sz="1200" dirty="0">
               <a:solidFill>
@@ -8559,7 +8671,7 @@
                 <a:tabLst/>
                 <a:defRPr/>
               </a:pPr>
-              <a:t>‹Nr.›</a:t>
+              <a:t>‹#›</a:t>
             </a:fld>
             <a:endParaRPr lang="de-DE" sz="1200" dirty="0">
               <a:solidFill>
@@ -9187,7 +9299,7 @@
                 <a:tabLst/>
                 <a:defRPr/>
               </a:pPr>
-              <a:t>‹Nr.›</a:t>
+              <a:t>‹#›</a:t>
             </a:fld>
             <a:endParaRPr lang="de-DE" sz="1200" dirty="0">
               <a:solidFill>
@@ -9542,7 +9654,7 @@
                 <a:tabLst/>
                 <a:defRPr/>
               </a:pPr>
-              <a:t>‹Nr.›</a:t>
+              <a:t>‹#›</a:t>
             </a:fld>
             <a:endParaRPr lang="de-DE" sz="1200" dirty="0">
               <a:solidFill>
@@ -9864,7 +9976,7 @@
                 <a:tabLst/>
                 <a:defRPr/>
               </a:pPr>
-              <a:t>‹Nr.›</a:t>
+              <a:t>‹#›</a:t>
             </a:fld>
             <a:endParaRPr lang="de-DE" sz="1200" dirty="0">
               <a:solidFill>
@@ -10386,7 +10498,7 @@
                 <a:tabLst/>
                 <a:defRPr/>
               </a:pPr>
-              <a:t>‹Nr.›</a:t>
+              <a:t>‹#›</a:t>
             </a:fld>
             <a:endParaRPr lang="de-DE" sz="1200" dirty="0">
               <a:solidFill>
@@ -10945,7 +11057,7 @@
                 <a:tabLst/>
                 <a:defRPr/>
               </a:pPr>
-              <a:t>‹Nr.›</a:t>
+              <a:t>‹#›</a:t>
             </a:fld>
             <a:endParaRPr lang="de-DE" sz="1200" dirty="0">
               <a:solidFill>
@@ -11457,7 +11569,7 @@
             <a:fld id="{2B839C97-FDF5-4C50-938A-F89495D2BCB9}" type="slidenum">
               <a:rPr lang="de-DE" smtClean="0"/>
               <a:pPr/>
-              <a:t>‹Nr.›</a:t>
+              <a:t>‹#›</a:t>
             </a:fld>
             <a:endParaRPr lang="de-DE" dirty="0">
               <a:solidFill>
@@ -12077,7 +12189,7 @@
         </p:nvSpPr>
         <p:spPr>
           <a:xfrm>
-            <a:off x="961767" y="1865870"/>
+            <a:off x="1172783" y="2452816"/>
             <a:ext cx="5686168" cy="1952368"/>
           </a:xfrm>
           <a:solidFill>
@@ -12085,7 +12197,7 @@
           </a:solidFill>
           <a:ln>
             <a:solidFill>
-              <a:schemeClr val="tx1"/>
+              <a:srgbClr val="252F3E"/>
             </a:solidFill>
           </a:ln>
           <a:effectLst>
@@ -12165,7 +12277,7 @@
         </p:nvGrpSpPr>
         <p:grpSpPr>
           <a:xfrm>
-            <a:off x="7386958" y="895500"/>
+            <a:off x="7703481" y="1000163"/>
             <a:ext cx="2602861" cy="4857674"/>
             <a:chOff x="8979539" y="1596434"/>
             <a:chExt cx="2323056" cy="4335479"/>
@@ -12396,19 +12508,19 @@
             </a:extLst>
           </p:cNvPr>
           <p:cNvCxnSpPr>
-            <a:stCxn id="12" idx="0"/>
+            <a:cxnSpLocks/>
           </p:cNvCxnSpPr>
           <p:nvPr/>
         </p:nvCxnSpPr>
         <p:spPr>
-          <a:xfrm flipH="1" flipV="1">
-            <a:off x="6096000" y="4184306"/>
-            <a:ext cx="8648" cy="668904"/>
+          <a:xfrm flipV="1">
+            <a:off x="5414308" y="4349853"/>
+            <a:ext cx="0" cy="591424"/>
           </a:xfrm>
           <a:prstGeom prst="line">
             <a:avLst/>
           </a:prstGeom>
-          <a:ln>
+          <a:ln w="19050">
             <a:solidFill>
               <a:srgbClr val="3A4351"/>
             </a:solidFill>
@@ -12489,7 +12601,15 @@
           <a:p>
             <a:r>
               <a:rPr lang="de-DE" dirty="0"/>
-              <a:t>Unterstützt mehr als 50 verschiedene Sprachen</a:t>
+              <a:t>Unterstützung von &gt;</a:t>
+            </a:r>
+            <a:r>
+              <a:rPr lang="de-DE" sz="1000" dirty="0"/>
+              <a:t> </a:t>
+            </a:r>
+            <a:r>
+              <a:rPr lang="de-DE" dirty="0"/>
+              <a:t>50 verschiedenen Sprachen</a:t>
             </a:r>
           </a:p>
           <a:p>
@@ -12500,7 +12620,7 @@
             </a:pPr>
             <a:r>
               <a:rPr lang="de-DE" dirty="0"/>
-              <a:t>Trainiert durch neuronale Netze</a:t>
+              <a:t>Training durch neuronale Netze</a:t>
             </a:r>
           </a:p>
           <a:p>
@@ -12571,7 +12691,7 @@
         </p:nvSpPr>
         <p:spPr>
           <a:xfrm>
-            <a:off x="4468816" y="3146765"/>
+            <a:off x="3649226" y="3248117"/>
             <a:ext cx="1635832" cy="369332"/>
           </a:xfrm>
           <a:prstGeom prst="rect">
@@ -12587,7 +12707,7 @@
             <a:r>
               <a:rPr lang="de-DE" dirty="0">
                 <a:solidFill>
-                  <a:srgbClr val="3883CE"/>
+                  <a:srgbClr val="FF9900"/>
                 </a:solidFill>
               </a:rPr>
               <a:t>Funktionsweise</a:t>
@@ -12609,7 +12729,7 @@
         </p:nvSpPr>
         <p:spPr>
           <a:xfrm>
-            <a:off x="4211536" y="4853210"/>
+            <a:off x="3521196" y="4970555"/>
             <a:ext cx="3786224" cy="646331"/>
           </a:xfrm>
           <a:prstGeom prst="rect">
@@ -12626,10 +12746,10 @@
             <a:r>
               <a:rPr lang="de-DE" dirty="0">
                 <a:solidFill>
-                  <a:srgbClr val="3A4351"/>
+                  <a:srgbClr val="232F3E"/>
                 </a:solidFill>
               </a:rPr>
-              <a:t>Mechanismen, um kontext-spezifische Übersetzung zu ermöglichen</a:t>
+              <a:t>Mechanismen, um kontextspezifische Übersetzung zu ermöglichen</a:t>
             </a:r>
           </a:p>
         </p:txBody>
@@ -12647,13 +12767,13 @@
           <p:nvPr>
             <p:extLst>
               <p:ext uri="{D42A27DB-BD31-4B8C-83A1-F6EECF244321}">
-                <p14:modId xmlns:p14="http://schemas.microsoft.com/office/powerpoint/2010/main" val="2849778076"/>
+                <p14:modId xmlns:p14="http://schemas.microsoft.com/office/powerpoint/2010/main" val="1203983945"/>
               </p:ext>
             </p:extLst>
           </p:nvPr>
         </p:nvGraphicFramePr>
         <p:xfrm>
-          <a:off x="1543764" y="3331432"/>
+          <a:off x="909044" y="3429000"/>
           <a:ext cx="7485936" cy="1386841"/>
         </p:xfrm>
         <a:graphic>
@@ -12794,7 +12914,7 @@
             </a:pPr>
             <a:r>
               <a:rPr lang="de-DE" dirty="0"/>
-              <a:t>Nutzt Verkettung der Phoneme (Laute)</a:t>
+              <a:t>Verkettung der Phoneme (Laute)</a:t>
             </a:r>
           </a:p>
           <a:p>
@@ -12805,7 +12925,15 @@
             </a:pPr>
             <a:r>
               <a:rPr lang="de-DE" dirty="0"/>
-              <a:t>Unterstützt mehr als 20 verschiedene Sprachen </a:t>
+              <a:t>Unterstützung von &gt;</a:t>
+            </a:r>
+            <a:r>
+              <a:rPr lang="de-DE" sz="1000" dirty="0"/>
+              <a:t> </a:t>
+            </a:r>
+            <a:r>
+              <a:rPr lang="de-DE" dirty="0"/>
+              <a:t>20 verschiedenen Sprachen </a:t>
             </a:r>
           </a:p>
           <a:p>
@@ -12816,7 +12944,7 @@
             </a:pPr>
             <a:r>
               <a:rPr lang="de-DE" dirty="0"/>
-              <a:t>Mit oft verschiedenen „Sprechern“</a:t>
+              <a:t>mit oft verschiedenen "Sprechern"</a:t>
             </a:r>
           </a:p>
         </p:txBody>
@@ -12835,7 +12963,7 @@
         </p:nvGrpSpPr>
         <p:grpSpPr>
           <a:xfrm>
-            <a:off x="6096000" y="3856990"/>
+            <a:off x="6856607" y="3794394"/>
             <a:ext cx="4133484" cy="1947773"/>
             <a:chOff x="6435456" y="3779520"/>
             <a:chExt cx="4133484" cy="1947773"/>
@@ -12854,7 +12982,7 @@
             <p:nvPr>
               <p:extLst>
                 <p:ext uri="{D42A27DB-BD31-4B8C-83A1-F6EECF244321}">
-                  <p14:modId xmlns:p14="http://schemas.microsoft.com/office/powerpoint/2010/main" val="2781515107"/>
+                  <p14:modId xmlns:p14="http://schemas.microsoft.com/office/powerpoint/2010/main" val="285973917"/>
                 </p:ext>
               </p:extLst>
             </p:nvPr>
@@ -13114,7 +13242,7 @@
             </a:pPr>
             <a:r>
               <a:rPr lang="de-DE" dirty="0"/>
-              <a:t>Ermöglicht menschlichere Aussprache</a:t>
+              <a:t>ermöglicht menschlichere Aussprache</a:t>
             </a:r>
           </a:p>
           <a:p>
@@ -13125,7 +13253,7 @@
             </a:pPr>
             <a:r>
               <a:rPr lang="de-DE" dirty="0"/>
-              <a:t>Unterstützt werden </a:t>
+              <a:t>unterstützt werden </a:t>
             </a:r>
             <a:r>
               <a:rPr lang="de-DE" b="1" dirty="0"/>

</xml_diff>